<commit_message>
add other solution for example F using cycle with known number of steps
</commit_message>
<xml_diff>
--- a/Prezentace/PGM_algoritmy k procvičení II.pptx
+++ b/Prezentace/PGM_algoritmy k procvičení II.pptx
@@ -13,6 +13,7 @@
     <p:sldId id="283" r:id="rId7"/>
     <p:sldId id="284" r:id="rId8"/>
     <p:sldId id="285" r:id="rId9"/>
+    <p:sldId id="286" r:id="rId10"/>
   </p:sldIdLst>
   <p:sldSz cx="12192000" cy="6858000"/>
   <p:notesSz cx="6858000" cy="9144000"/>
@@ -865,7 +866,7 @@
             <a:fld id="{B61BEF0D-F0BB-DE4B-95CE-6DB70DBA9567}" type="datetimeFigureOut">
               <a:rPr lang="en-US" dirty="0"/>
               <a:pPr/>
-              <a:t>9/15/2020</a:t>
+              <a:t>9/16/2020</a:t>
             </a:fld>
             <a:endParaRPr lang="en-US" dirty="0"/>
           </a:p>
@@ -1113,7 +1114,7 @@
             <a:fld id="{B61BEF0D-F0BB-DE4B-95CE-6DB70DBA9567}" type="datetimeFigureOut">
               <a:rPr lang="en-US" dirty="0"/>
               <a:pPr/>
-              <a:t>9/15/2020</a:t>
+              <a:t>9/16/2020</a:t>
             </a:fld>
             <a:endParaRPr lang="en-US" dirty="0"/>
           </a:p>
@@ -1424,7 +1425,7 @@
             <a:fld id="{B61BEF0D-F0BB-DE4B-95CE-6DB70DBA9567}" type="datetimeFigureOut">
               <a:rPr lang="en-US" dirty="0"/>
               <a:pPr/>
-              <a:t>9/15/2020</a:t>
+              <a:t>9/16/2020</a:t>
             </a:fld>
             <a:endParaRPr lang="en-US" dirty="0"/>
           </a:p>
@@ -1754,7 +1755,7 @@
             <a:fld id="{B61BEF0D-F0BB-DE4B-95CE-6DB70DBA9567}" type="datetimeFigureOut">
               <a:rPr lang="en-US" dirty="0"/>
               <a:pPr/>
-              <a:t>9/15/2020</a:t>
+              <a:t>9/16/2020</a:t>
             </a:fld>
             <a:endParaRPr lang="en-US" dirty="0"/>
           </a:p>
@@ -2065,7 +2066,7 @@
             <a:fld id="{B61BEF0D-F0BB-DE4B-95CE-6DB70DBA9567}" type="datetimeFigureOut">
               <a:rPr lang="en-US" dirty="0"/>
               <a:pPr/>
-              <a:t>9/15/2020</a:t>
+              <a:t>9/16/2020</a:t>
             </a:fld>
             <a:endParaRPr lang="en-US" dirty="0"/>
           </a:p>
@@ -2455,7 +2456,7 @@
             <a:fld id="{B61BEF0D-F0BB-DE4B-95CE-6DB70DBA9567}" type="datetimeFigureOut">
               <a:rPr lang="en-US" dirty="0"/>
               <a:pPr/>
-              <a:t>9/15/2020</a:t>
+              <a:t>9/16/2020</a:t>
             </a:fld>
             <a:endParaRPr lang="en-US" dirty="0"/>
           </a:p>
@@ -2621,7 +2622,7 @@
           <a:p>
             <a:fld id="{55C6B4A9-1611-4792-9094-5F34BCA07E0B}" type="datetimeFigureOut">
               <a:rPr lang="en-US" dirty="0"/>
-              <a:t>9/15/2020</a:t>
+              <a:t>9/16/2020</a:t>
             </a:fld>
             <a:endParaRPr lang="en-US" dirty="0"/>
           </a:p>
@@ -2797,7 +2798,7 @@
             <a:fld id="{B61BEF0D-F0BB-DE4B-95CE-6DB70DBA9567}" type="datetimeFigureOut">
               <a:rPr lang="en-US" dirty="0"/>
               <a:pPr/>
-              <a:t>9/15/2020</a:t>
+              <a:t>9/16/2020</a:t>
             </a:fld>
             <a:endParaRPr lang="en-US" dirty="0"/>
           </a:p>
@@ -2963,7 +2964,7 @@
           <a:p>
             <a:fld id="{42A54C80-263E-416B-A8E0-580EDEADCBDC}" type="datetimeFigureOut">
               <a:rPr lang="en-US" dirty="0"/>
-              <a:t>9/15/2020</a:t>
+              <a:t>9/16/2020</a:t>
             </a:fld>
             <a:endParaRPr lang="en-US" dirty="0"/>
           </a:p>
@@ -3206,7 +3207,7 @@
             <a:fld id="{B61BEF0D-F0BB-DE4B-95CE-6DB70DBA9567}" type="datetimeFigureOut">
               <a:rPr lang="en-US" dirty="0"/>
               <a:pPr/>
-              <a:t>9/15/2020</a:t>
+              <a:t>9/16/2020</a:t>
             </a:fld>
             <a:endParaRPr lang="en-US" dirty="0"/>
           </a:p>
@@ -3434,7 +3435,7 @@
           <a:p>
             <a:fld id="{42A54C80-263E-416B-A8E0-580EDEADCBDC}" type="datetimeFigureOut">
               <a:rPr lang="en-US" dirty="0"/>
-              <a:t>9/15/2020</a:t>
+              <a:t>9/16/2020</a:t>
             </a:fld>
             <a:endParaRPr lang="en-US" dirty="0"/>
           </a:p>
@@ -3804,7 +3805,7 @@
             <a:fld id="{B61BEF0D-F0BB-DE4B-95CE-6DB70DBA9567}" type="datetimeFigureOut">
               <a:rPr lang="en-US" dirty="0"/>
               <a:pPr/>
-              <a:t>9/15/2020</a:t>
+              <a:t>9/16/2020</a:t>
             </a:fld>
             <a:endParaRPr lang="en-US" dirty="0"/>
           </a:p>
@@ -3924,7 +3925,7 @@
             <a:fld id="{B61BEF0D-F0BB-DE4B-95CE-6DB70DBA9567}" type="datetimeFigureOut">
               <a:rPr lang="en-US" dirty="0"/>
               <a:pPr/>
-              <a:t>9/15/2020</a:t>
+              <a:t>9/16/2020</a:t>
             </a:fld>
             <a:endParaRPr lang="en-US" dirty="0"/>
           </a:p>
@@ -4016,7 +4017,7 @@
             <a:fld id="{B61BEF0D-F0BB-DE4B-95CE-6DB70DBA9567}" type="datetimeFigureOut">
               <a:rPr lang="en-US" dirty="0"/>
               <a:pPr/>
-              <a:t>9/15/2020</a:t>
+              <a:t>9/16/2020</a:t>
             </a:fld>
             <a:endParaRPr lang="en-US" dirty="0"/>
           </a:p>
@@ -4267,7 +4268,7 @@
           <a:p>
             <a:fld id="{42A54C80-263E-416B-A8E0-580EDEADCBDC}" type="datetimeFigureOut">
               <a:rPr lang="en-US" dirty="0"/>
-              <a:t>9/15/2020</a:t>
+              <a:t>9/16/2020</a:t>
             </a:fld>
             <a:endParaRPr lang="en-US" dirty="0"/>
           </a:p>
@@ -4569,7 +4570,7 @@
             <a:fld id="{B61BEF0D-F0BB-DE4B-95CE-6DB70DBA9567}" type="datetimeFigureOut">
               <a:rPr lang="en-US" dirty="0"/>
               <a:pPr/>
-              <a:t>9/15/2020</a:t>
+              <a:t>9/16/2020</a:t>
             </a:fld>
             <a:endParaRPr lang="en-US" dirty="0"/>
           </a:p>
@@ -5267,7 +5268,7 @@
             <a:fld id="{B61BEF0D-F0BB-DE4B-95CE-6DB70DBA9567}" type="datetimeFigureOut">
               <a:rPr lang="en-US" dirty="0"/>
               <a:pPr/>
-              <a:t>9/15/2020</a:t>
+              <a:t>9/16/2020</a:t>
             </a:fld>
             <a:endParaRPr lang="en-US" dirty="0"/>
           </a:p>
@@ -6559,6 +6560,93 @@
 </p:sld>
 </file>
 
+<file path=ppt/slides/slide9.xml><?xml version="1.0" encoding="utf-8"?>
+<p:sld xmlns:a="http://schemas.openxmlformats.org/drawingml/2006/main" xmlns:r="http://schemas.openxmlformats.org/officeDocument/2006/relationships" xmlns:p="http://schemas.openxmlformats.org/presentationml/2006/main">
+  <p:cSld>
+    <p:spTree>
+      <p:nvGrpSpPr>
+        <p:cNvPr id="1" name=""/>
+        <p:cNvGrpSpPr/>
+        <p:nvPr/>
+      </p:nvGrpSpPr>
+      <p:grpSpPr>
+        <a:xfrm>
+          <a:off x="0" y="0"/>
+          <a:ext cx="0" cy="0"/>
+          <a:chOff x="0" y="0"/>
+          <a:chExt cx="0" cy="0"/>
+        </a:xfrm>
+      </p:grpSpPr>
+      <p:sp>
+        <p:nvSpPr>
+          <p:cNvPr id="2" name="Nadpis 1">
+            <a:extLst>
+              <a:ext uri="{FF2B5EF4-FFF2-40B4-BE49-F238E27FC236}">
+                <a16:creationId xmlns:a16="http://schemas.microsoft.com/office/drawing/2014/main" id="{56E87421-DDAD-4FE3-A3D3-2BF81BC2701C}"/>
+              </a:ext>
+            </a:extLst>
+          </p:cNvPr>
+          <p:cNvSpPr>
+            <a:spLocks noGrp="1"/>
+          </p:cNvSpPr>
+          <p:nvPr>
+            <p:ph type="title"/>
+          </p:nvPr>
+        </p:nvSpPr>
+        <p:spPr/>
+        <p:txBody>
+          <a:bodyPr/>
+          <a:lstStyle/>
+          <a:p>
+            <a:r>
+              <a:rPr lang="cs-CZ" dirty="0"/>
+              <a:t>Řešení F s použitím cyklu s pevným počtem opakování</a:t>
+            </a:r>
+          </a:p>
+        </p:txBody>
+      </p:sp>
+      <p:pic>
+        <p:nvPicPr>
+          <p:cNvPr id="7" name="Zástupný obsah 6" descr="Obsah obrázku text&#10;&#10;Popis byl vytvořen automaticky">
+            <a:extLst>
+              <a:ext uri="{FF2B5EF4-FFF2-40B4-BE49-F238E27FC236}">
+                <a16:creationId xmlns:a16="http://schemas.microsoft.com/office/drawing/2014/main" id="{8B09EA82-D6FF-4EB9-905C-F3904B774E38}"/>
+              </a:ext>
+            </a:extLst>
+          </p:cNvPr>
+          <p:cNvPicPr>
+            <a:picLocks noGrp="1" noChangeAspect="1"/>
+          </p:cNvPicPr>
+          <p:nvPr>
+            <p:ph idx="1"/>
+          </p:nvPr>
+        </p:nvPicPr>
+        <p:blipFill>
+          <a:blip r:embed="rId2"/>
+          <a:stretch>
+            <a:fillRect/>
+          </a:stretch>
+        </p:blipFill>
+        <p:spPr>
+          <a:xfrm>
+            <a:off x="3672308" y="1930400"/>
+            <a:ext cx="4287467" cy="5002045"/>
+          </a:xfrm>
+        </p:spPr>
+      </p:pic>
+    </p:spTree>
+    <p:extLst>
+      <p:ext uri="{BB962C8B-B14F-4D97-AF65-F5344CB8AC3E}">
+        <p14:creationId xmlns:p14="http://schemas.microsoft.com/office/powerpoint/2010/main" val="3481455471"/>
+      </p:ext>
+    </p:extLst>
+  </p:cSld>
+  <p:clrMapOvr>
+    <a:masterClrMapping/>
+  </p:clrMapOvr>
+</p:sld>
+</file>
+
 <file path=ppt/theme/theme1.xml><?xml version="1.0" encoding="utf-8"?>
 <a:theme xmlns:a="http://schemas.openxmlformats.org/drawingml/2006/main" name="Fazeta">
   <a:themeElements>

</xml_diff>